<commit_message>
[master] added as keyword note
</commit_message>
<xml_diff>
--- a/extra_lab-oop/extra_lab-oop.pptx
+++ b/extra_lab-oop/extra_lab-oop.pptx
@@ -255,7 +255,7 @@
           <a:p>
             <a:fld id="{81C4B3FE-0320-8142-8396-5C3025C019EC}" type="datetimeFigureOut">
               <a:rPr lang="en-IT" smtClean="0"/>
-              <a:t>11/03/22</a:t>
+              <a:t>14/03/22</a:t>
             </a:fld>
             <a:endParaRPr lang="en-IT"/>
           </a:p>
@@ -26365,6 +26365,290 @@
               <a:t>25</a:t>
             </a:fld>
             <a:endParaRPr lang="en-GB" dirty="0"/>
+          </a:p>
+        </p:txBody>
+      </p:sp>
+      <p:cxnSp>
+        <p:nvCxnSpPr>
+          <p:cNvPr id="8" name="Straight Arrow Connector 7">
+            <a:extLst>
+              <a:ext uri="{FF2B5EF4-FFF2-40B4-BE49-F238E27FC236}">
+                <a16:creationId xmlns:a16="http://schemas.microsoft.com/office/drawing/2014/main" id="{A122186D-857D-6746-AF47-01F1B6D8C35C}"/>
+              </a:ext>
+            </a:extLst>
+          </p:cNvPr>
+          <p:cNvCxnSpPr>
+            <a:cxnSpLocks/>
+            <a:stCxn id="9" idx="1"/>
+          </p:cNvCxnSpPr>
+          <p:nvPr/>
+        </p:nvCxnSpPr>
+        <p:spPr>
+          <a:xfrm flipH="1">
+            <a:off x="4383741" y="5147146"/>
+            <a:ext cx="3374801" cy="688878"/>
+          </a:xfrm>
+          <a:prstGeom prst="straightConnector1">
+            <a:avLst/>
+          </a:prstGeom>
+          <a:ln>
+            <a:tailEnd type="triangle"/>
+          </a:ln>
+        </p:spPr>
+        <p:style>
+          <a:lnRef idx="1">
+            <a:schemeClr val="dk1"/>
+          </a:lnRef>
+          <a:fillRef idx="0">
+            <a:schemeClr val="dk1"/>
+          </a:fillRef>
+          <a:effectRef idx="0">
+            <a:schemeClr val="dk1"/>
+          </a:effectRef>
+          <a:fontRef idx="minor">
+            <a:schemeClr val="tx1"/>
+          </a:fontRef>
+        </p:style>
+      </p:cxnSp>
+      <p:sp>
+        <p:nvSpPr>
+          <p:cNvPr id="9" name="Content Placeholder 2">
+            <a:extLst>
+              <a:ext uri="{FF2B5EF4-FFF2-40B4-BE49-F238E27FC236}">
+                <a16:creationId xmlns:a16="http://schemas.microsoft.com/office/drawing/2014/main" id="{13F00912-600C-EE47-A978-1CC0C72F8A05}"/>
+              </a:ext>
+            </a:extLst>
+          </p:cNvPr>
+          <p:cNvSpPr txBox="1">
+            <a:spLocks/>
+          </p:cNvSpPr>
+          <p:nvPr/>
+        </p:nvSpPr>
+        <p:spPr>
+          <a:xfrm>
+            <a:off x="7758542" y="4796741"/>
+            <a:ext cx="3643322" cy="700809"/>
+          </a:xfrm>
+          <a:prstGeom prst="rect">
+            <a:avLst/>
+          </a:prstGeom>
+          <a:solidFill>
+            <a:schemeClr val="accent6">
+              <a:lumMod val="20000"/>
+              <a:lumOff val="80000"/>
+            </a:schemeClr>
+          </a:solidFill>
+        </p:spPr>
+        <p:txBody>
+          <a:bodyPr vert="horz" lIns="91440" tIns="45720" rIns="91440" bIns="45720" rtlCol="0" anchor="ctr">
+            <a:normAutofit/>
+          </a:bodyPr>
+          <a:lstStyle>
+            <a:lvl1pPr marL="342900" indent="-342900" algn="l" defTabSz="914400" rtl="0" eaLnBrk="1" latinLnBrk="0" hangingPunct="1">
+              <a:lnSpc>
+                <a:spcPct val="90000"/>
+              </a:lnSpc>
+              <a:spcBef>
+                <a:spcPts val="1000"/>
+              </a:spcBef>
+              <a:buClr>
+                <a:srgbClr val="00B050"/>
+              </a:buClr>
+              <a:buFont typeface="Wingdings" panose="05000000000000000000" pitchFamily="2" charset="2"/>
+              <a:buChar char="Ø"/>
+              <a:defRPr sz="2400" kern="1200">
+                <a:solidFill>
+                  <a:schemeClr val="tx1"/>
+                </a:solidFill>
+                <a:latin typeface="Palatino Linotype" panose="02040502050505030304" pitchFamily="18" charset="0"/>
+                <a:ea typeface="+mn-ea"/>
+                <a:cs typeface="+mn-cs"/>
+              </a:defRPr>
+            </a:lvl1pPr>
+            <a:lvl2pPr marL="685800" indent="-228600" algn="l" defTabSz="914400" rtl="0" eaLnBrk="1" latinLnBrk="0" hangingPunct="1">
+              <a:lnSpc>
+                <a:spcPct val="90000"/>
+              </a:lnSpc>
+              <a:spcBef>
+                <a:spcPts val="500"/>
+              </a:spcBef>
+              <a:buClr>
+                <a:srgbClr val="00B050"/>
+              </a:buClr>
+              <a:buFont typeface="Wingdings" panose="05000000000000000000" pitchFamily="2" charset="2"/>
+              <a:buChar char="§"/>
+              <a:defRPr sz="2000" kern="1200">
+                <a:solidFill>
+                  <a:schemeClr val="tx1"/>
+                </a:solidFill>
+                <a:latin typeface="Palatino Linotype" panose="02040502050505030304" pitchFamily="18" charset="0"/>
+                <a:ea typeface="+mn-ea"/>
+                <a:cs typeface="+mn-cs"/>
+              </a:defRPr>
+            </a:lvl2pPr>
+            <a:lvl3pPr marL="1143000" indent="-228600" algn="l" defTabSz="914400" rtl="0" eaLnBrk="1" latinLnBrk="0" hangingPunct="1">
+              <a:lnSpc>
+                <a:spcPct val="90000"/>
+              </a:lnSpc>
+              <a:spcBef>
+                <a:spcPts val="500"/>
+              </a:spcBef>
+              <a:buClr>
+                <a:srgbClr val="00B050"/>
+              </a:buClr>
+              <a:buFont typeface="Arial" panose="020B0604020202020204" pitchFamily="34" charset="0"/>
+              <a:buChar char="•"/>
+              <a:defRPr sz="1800" kern="1200">
+                <a:solidFill>
+                  <a:schemeClr val="tx1"/>
+                </a:solidFill>
+                <a:latin typeface="Palatino Linotype" panose="02040502050505030304" pitchFamily="18" charset="0"/>
+                <a:ea typeface="+mn-ea"/>
+                <a:cs typeface="+mn-cs"/>
+              </a:defRPr>
+            </a:lvl3pPr>
+            <a:lvl4pPr marL="1600200" indent="-228600" algn="l" defTabSz="914400" rtl="0" eaLnBrk="1" latinLnBrk="0" hangingPunct="1">
+              <a:lnSpc>
+                <a:spcPct val="90000"/>
+              </a:lnSpc>
+              <a:spcBef>
+                <a:spcPts val="500"/>
+              </a:spcBef>
+              <a:buClr>
+                <a:srgbClr val="00B050"/>
+              </a:buClr>
+              <a:buFont typeface="Courier New" panose="02070309020205020404" pitchFamily="49" charset="0"/>
+              <a:buChar char="o"/>
+              <a:defRPr sz="1600" kern="1200">
+                <a:solidFill>
+                  <a:schemeClr val="tx1"/>
+                </a:solidFill>
+                <a:latin typeface="Palatino Linotype" panose="02040502050505030304" pitchFamily="18" charset="0"/>
+                <a:ea typeface="+mn-ea"/>
+                <a:cs typeface="+mn-cs"/>
+              </a:defRPr>
+            </a:lvl4pPr>
+            <a:lvl5pPr marL="2057400" indent="-228600" algn="l" defTabSz="914400" rtl="0" eaLnBrk="1" latinLnBrk="0" hangingPunct="1">
+              <a:lnSpc>
+                <a:spcPct val="90000"/>
+              </a:lnSpc>
+              <a:spcBef>
+                <a:spcPts val="500"/>
+              </a:spcBef>
+              <a:buClr>
+                <a:srgbClr val="00B050"/>
+              </a:buClr>
+              <a:buFont typeface="Times New Roman" panose="02020603050405020304" pitchFamily="18" charset="0"/>
+              <a:buChar char="̶"/>
+              <a:defRPr sz="1600" kern="1200">
+                <a:solidFill>
+                  <a:schemeClr val="tx1"/>
+                </a:solidFill>
+                <a:latin typeface="Palatino Linotype" panose="02040502050505030304" pitchFamily="18" charset="0"/>
+                <a:ea typeface="+mn-ea"/>
+                <a:cs typeface="+mn-cs"/>
+              </a:defRPr>
+            </a:lvl5pPr>
+            <a:lvl6pPr marL="2514600" indent="-228600" algn="l" defTabSz="914400" rtl="0" eaLnBrk="1" latinLnBrk="0" hangingPunct="1">
+              <a:lnSpc>
+                <a:spcPct val="90000"/>
+              </a:lnSpc>
+              <a:spcBef>
+                <a:spcPts val="500"/>
+              </a:spcBef>
+              <a:buFont typeface="Arial" panose="020B0604020202020204" pitchFamily="34" charset="0"/>
+              <a:buChar char="•"/>
+              <a:defRPr sz="1800" kern="1200">
+                <a:solidFill>
+                  <a:schemeClr val="tx1"/>
+                </a:solidFill>
+                <a:latin typeface="+mn-lt"/>
+                <a:ea typeface="+mn-ea"/>
+                <a:cs typeface="+mn-cs"/>
+              </a:defRPr>
+            </a:lvl6pPr>
+            <a:lvl7pPr marL="2971800" indent="-228600" algn="l" defTabSz="914400" rtl="0" eaLnBrk="1" latinLnBrk="0" hangingPunct="1">
+              <a:lnSpc>
+                <a:spcPct val="90000"/>
+              </a:lnSpc>
+              <a:spcBef>
+                <a:spcPts val="500"/>
+              </a:spcBef>
+              <a:buFont typeface="Arial" panose="020B0604020202020204" pitchFamily="34" charset="0"/>
+              <a:buChar char="•"/>
+              <a:defRPr sz="1800" kern="1200">
+                <a:solidFill>
+                  <a:schemeClr val="tx1"/>
+                </a:solidFill>
+                <a:latin typeface="+mn-lt"/>
+                <a:ea typeface="+mn-ea"/>
+                <a:cs typeface="+mn-cs"/>
+              </a:defRPr>
+            </a:lvl7pPr>
+            <a:lvl8pPr marL="3429000" indent="-228600" algn="l" defTabSz="914400" rtl="0" eaLnBrk="1" latinLnBrk="0" hangingPunct="1">
+              <a:lnSpc>
+                <a:spcPct val="90000"/>
+              </a:lnSpc>
+              <a:spcBef>
+                <a:spcPts val="500"/>
+              </a:spcBef>
+              <a:buFont typeface="Arial" panose="020B0604020202020204" pitchFamily="34" charset="0"/>
+              <a:buChar char="•"/>
+              <a:defRPr sz="1800" kern="1200">
+                <a:solidFill>
+                  <a:schemeClr val="tx1"/>
+                </a:solidFill>
+                <a:latin typeface="+mn-lt"/>
+                <a:ea typeface="+mn-ea"/>
+                <a:cs typeface="+mn-cs"/>
+              </a:defRPr>
+            </a:lvl8pPr>
+            <a:lvl9pPr marL="3886200" indent="-228600" algn="l" defTabSz="914400" rtl="0" eaLnBrk="1" latinLnBrk="0" hangingPunct="1">
+              <a:lnSpc>
+                <a:spcPct val="90000"/>
+              </a:lnSpc>
+              <a:spcBef>
+                <a:spcPts val="500"/>
+              </a:spcBef>
+              <a:buFont typeface="Arial" panose="020B0604020202020204" pitchFamily="34" charset="0"/>
+              <a:buChar char="•"/>
+              <a:defRPr sz="1800" kern="1200">
+                <a:solidFill>
+                  <a:schemeClr val="tx1"/>
+                </a:solidFill>
+                <a:latin typeface="+mn-lt"/>
+                <a:ea typeface="+mn-ea"/>
+                <a:cs typeface="+mn-cs"/>
+              </a:defRPr>
+            </a:lvl9pPr>
+          </a:lstStyle>
+          <a:p>
+            <a:pPr marL="0" indent="0">
+              <a:buNone/>
+            </a:pPr>
+            <a:r>
+              <a:rPr lang="en-US" sz="1600" dirty="0">
+                <a:ea typeface="Palatino" pitchFamily="2" charset="77"/>
+              </a:rPr>
+              <a:t>The </a:t>
+            </a:r>
+            <a:r>
+              <a:rPr lang="en-US" sz="1600" b="1" dirty="0">
+                <a:latin typeface="Courier" pitchFamily="2" charset="0"/>
+                <a:ea typeface="Palatino" pitchFamily="2" charset="77"/>
+              </a:rPr>
+              <a:t>as</a:t>
+            </a:r>
+            <a:r>
+              <a:rPr lang="en-US" sz="1600" dirty="0">
+                <a:ea typeface="Palatino" pitchFamily="2" charset="77"/>
+              </a:rPr>
+              <a:t> keyword is used to cast an object to another type</a:t>
+            </a:r>
+            <a:endParaRPr lang="en-IT" sz="1600" dirty="0">
+              <a:latin typeface="Courier" pitchFamily="2" charset="0"/>
+              <a:ea typeface="Palatino" pitchFamily="2" charset="77"/>
+            </a:endParaRPr>
           </a:p>
         </p:txBody>
       </p:sp>

</xml_diff>